<commit_message>
Modified requieriments documents change the priority of requieriments
</commit_message>
<xml_diff>
--- a/presentacion/JHawanet.pptx
+++ b/presentacion/JHawanet.pptx
@@ -235,7 +235,7 @@
           <a:p>
             <a:fld id="{51B281DC-3243-4857-86BA-089C4C7CAAB5}" type="datetimeFigureOut">
               <a:rPr lang="es-CL" smtClean="0"/>
-              <a:t>21-07-2020</a:t>
+              <a:t>23-07-2020</a:t>
             </a:fld>
             <a:endParaRPr lang="es-CL"/>
           </a:p>
@@ -4491,7 +4491,7 @@
           <a:p>
             <a:fld id="{83DCBB36-9ACF-4FA9-9913-E538D3B09652}" type="datetimeFigureOut">
               <a:rPr lang="es-CL" smtClean="0"/>
-              <a:t>21-07-2020</a:t>
+              <a:t>23-07-2020</a:t>
             </a:fld>
             <a:endParaRPr lang="es-CL"/>
           </a:p>
@@ -4766,7 +4766,7 @@
           <a:p>
             <a:fld id="{83DCBB36-9ACF-4FA9-9913-E538D3B09652}" type="datetimeFigureOut">
               <a:rPr lang="es-CL" smtClean="0"/>
-              <a:t>21-07-2020</a:t>
+              <a:t>23-07-2020</a:t>
             </a:fld>
             <a:endParaRPr lang="es-CL"/>
           </a:p>
@@ -4960,7 +4960,7 @@
           <a:p>
             <a:fld id="{83DCBB36-9ACF-4FA9-9913-E538D3B09652}" type="datetimeFigureOut">
               <a:rPr lang="es-CL" smtClean="0"/>
-              <a:t>21-07-2020</a:t>
+              <a:t>23-07-2020</a:t>
             </a:fld>
             <a:endParaRPr lang="es-CL"/>
           </a:p>
@@ -5233,7 +5233,7 @@
           <a:p>
             <a:fld id="{83DCBB36-9ACF-4FA9-9913-E538D3B09652}" type="datetimeFigureOut">
               <a:rPr lang="es-CL" smtClean="0"/>
-              <a:t>21-07-2020</a:t>
+              <a:t>23-07-2020</a:t>
             </a:fld>
             <a:endParaRPr lang="es-CL"/>
           </a:p>
@@ -5574,7 +5574,7 @@
           <a:p>
             <a:fld id="{83DCBB36-9ACF-4FA9-9913-E538D3B09652}" type="datetimeFigureOut">
               <a:rPr lang="es-CL" smtClean="0"/>
-              <a:t>21-07-2020</a:t>
+              <a:t>23-07-2020</a:t>
             </a:fld>
             <a:endParaRPr lang="es-CL"/>
           </a:p>
@@ -6197,7 +6197,7 @@
           <a:p>
             <a:fld id="{83DCBB36-9ACF-4FA9-9913-E538D3B09652}" type="datetimeFigureOut">
               <a:rPr lang="es-CL" smtClean="0"/>
-              <a:t>21-07-2020</a:t>
+              <a:t>23-07-2020</a:t>
             </a:fld>
             <a:endParaRPr lang="es-CL"/>
           </a:p>
@@ -7057,7 +7057,7 @@
           <a:p>
             <a:fld id="{83DCBB36-9ACF-4FA9-9913-E538D3B09652}" type="datetimeFigureOut">
               <a:rPr lang="es-CL" smtClean="0"/>
-              <a:t>21-07-2020</a:t>
+              <a:t>23-07-2020</a:t>
             </a:fld>
             <a:endParaRPr lang="es-CL"/>
           </a:p>
@@ -7227,7 +7227,7 @@
           <a:p>
             <a:fld id="{83DCBB36-9ACF-4FA9-9913-E538D3B09652}" type="datetimeFigureOut">
               <a:rPr lang="es-CL" smtClean="0"/>
-              <a:t>21-07-2020</a:t>
+              <a:t>23-07-2020</a:t>
             </a:fld>
             <a:endParaRPr lang="es-CL"/>
           </a:p>
@@ -7407,7 +7407,7 @@
           <a:p>
             <a:fld id="{83DCBB36-9ACF-4FA9-9913-E538D3B09652}" type="datetimeFigureOut">
               <a:rPr lang="es-CL" smtClean="0"/>
-              <a:t>21-07-2020</a:t>
+              <a:t>23-07-2020</a:t>
             </a:fld>
             <a:endParaRPr lang="es-CL"/>
           </a:p>
@@ -7577,7 +7577,7 @@
           <a:p>
             <a:fld id="{83DCBB36-9ACF-4FA9-9913-E538D3B09652}" type="datetimeFigureOut">
               <a:rPr lang="es-CL" smtClean="0"/>
-              <a:t>21-07-2020</a:t>
+              <a:t>23-07-2020</a:t>
             </a:fld>
             <a:endParaRPr lang="es-CL"/>
           </a:p>
@@ -7824,7 +7824,7 @@
           <a:p>
             <a:fld id="{83DCBB36-9ACF-4FA9-9913-E538D3B09652}" type="datetimeFigureOut">
               <a:rPr lang="es-CL" smtClean="0"/>
-              <a:t>21-07-2020</a:t>
+              <a:t>23-07-2020</a:t>
             </a:fld>
             <a:endParaRPr lang="es-CL"/>
           </a:p>
@@ -8116,7 +8116,7 @@
           <a:p>
             <a:fld id="{83DCBB36-9ACF-4FA9-9913-E538D3B09652}" type="datetimeFigureOut">
               <a:rPr lang="es-CL" smtClean="0"/>
-              <a:t>21-07-2020</a:t>
+              <a:t>23-07-2020</a:t>
             </a:fld>
             <a:endParaRPr lang="es-CL"/>
           </a:p>
@@ -8560,7 +8560,7 @@
           <a:p>
             <a:fld id="{83DCBB36-9ACF-4FA9-9913-E538D3B09652}" type="datetimeFigureOut">
               <a:rPr lang="es-CL" smtClean="0"/>
-              <a:t>21-07-2020</a:t>
+              <a:t>23-07-2020</a:t>
             </a:fld>
             <a:endParaRPr lang="es-CL"/>
           </a:p>
@@ -8678,7 +8678,7 @@
           <a:p>
             <a:fld id="{83DCBB36-9ACF-4FA9-9913-E538D3B09652}" type="datetimeFigureOut">
               <a:rPr lang="es-CL" smtClean="0"/>
-              <a:t>21-07-2020</a:t>
+              <a:t>23-07-2020</a:t>
             </a:fld>
             <a:endParaRPr lang="es-CL"/>
           </a:p>
@@ -8773,7 +8773,7 @@
           <a:p>
             <a:fld id="{83DCBB36-9ACF-4FA9-9913-E538D3B09652}" type="datetimeFigureOut">
               <a:rPr lang="es-CL" smtClean="0"/>
-              <a:t>21-07-2020</a:t>
+              <a:t>23-07-2020</a:t>
             </a:fld>
             <a:endParaRPr lang="es-CL"/>
           </a:p>
@@ -9052,7 +9052,7 @@
           <a:p>
             <a:fld id="{83DCBB36-9ACF-4FA9-9913-E538D3B09652}" type="datetimeFigureOut">
               <a:rPr lang="es-CL" smtClean="0"/>
-              <a:t>21-07-2020</a:t>
+              <a:t>23-07-2020</a:t>
             </a:fld>
             <a:endParaRPr lang="es-CL"/>
           </a:p>
@@ -9327,7 +9327,7 @@
           <a:p>
             <a:fld id="{83DCBB36-9ACF-4FA9-9913-E538D3B09652}" type="datetimeFigureOut">
               <a:rPr lang="es-CL" smtClean="0"/>
-              <a:t>21-07-2020</a:t>
+              <a:t>23-07-2020</a:t>
             </a:fld>
             <a:endParaRPr lang="es-CL"/>
           </a:p>
@@ -9756,7 +9756,7 @@
           <a:p>
             <a:fld id="{83DCBB36-9ACF-4FA9-9913-E538D3B09652}" type="datetimeFigureOut">
               <a:rPr lang="es-CL" smtClean="0"/>
-              <a:t>21-07-2020</a:t>
+              <a:t>23-07-2020</a:t>
             </a:fld>
             <a:endParaRPr lang="es-CL"/>
           </a:p>
@@ -13015,7 +13015,7 @@
           <a:graphicData uri="http://schemas.openxmlformats.org/presentationml/2006/ole">
             <mc:AlternateContent xmlns:mc="http://schemas.openxmlformats.org/markup-compatibility/2006">
               <mc:Choice xmlns:v="urn:schemas-microsoft-com:vml" Requires="v">
-                <p:oleObj spid="_x0000_s10259" name="PDF" r:id="rId4" imgW="0" imgH="360" progId="FoxitReader.Document">
+                <p:oleObj spid="_x0000_s10261" name="PDF" r:id="rId4" imgW="0" imgH="360" progId="FoxitReader.Document">
                   <p:embed/>
                 </p:oleObj>
               </mc:Choice>
@@ -16560,7 +16560,7 @@
           <a:graphicData uri="http://schemas.openxmlformats.org/presentationml/2006/ole">
             <mc:AlternateContent xmlns:mc="http://schemas.openxmlformats.org/markup-compatibility/2006">
               <mc:Choice xmlns:v="urn:schemas-microsoft-com:vml" Requires="v">
-                <p:oleObj spid="_x0000_s1059" name="PDF" r:id="rId3" imgW="0" imgH="360" progId="FoxitReader.Document">
+                <p:oleObj spid="_x0000_s1061" name="PDF" r:id="rId3" imgW="0" imgH="360" progId="FoxitReader.Document">
                   <p:embed/>
                 </p:oleObj>
               </mc:Choice>
@@ -17641,7 +17641,7 @@
           <a:graphicData uri="http://schemas.openxmlformats.org/presentationml/2006/ole">
             <mc:AlternateContent xmlns:mc="http://schemas.openxmlformats.org/markup-compatibility/2006">
               <mc:Choice xmlns:v="urn:schemas-microsoft-com:vml" Requires="v">
-                <p:oleObj spid="_x0000_s2081" name="PDF" r:id="rId3" imgW="0" imgH="360" progId="FoxitReader.Document">
+                <p:oleObj spid="_x0000_s2083" name="PDF" r:id="rId3" imgW="0" imgH="360" progId="FoxitReader.Document">
                   <p:embed/>
                 </p:oleObj>
               </mc:Choice>
@@ -18314,7 +18314,7 @@
           <a:graphicData uri="http://schemas.openxmlformats.org/presentationml/2006/ole">
             <mc:AlternateContent xmlns:mc="http://schemas.openxmlformats.org/markup-compatibility/2006">
               <mc:Choice xmlns:v="urn:schemas-microsoft-com:vml" Requires="v">
-                <p:oleObj spid="_x0000_s3106" name="PDF" r:id="rId3" imgW="0" imgH="360" progId="FoxitReader.Document">
+                <p:oleObj spid="_x0000_s3108" name="PDF" r:id="rId3" imgW="0" imgH="360" progId="FoxitReader.Document">
                   <p:embed/>
                 </p:oleObj>
               </mc:Choice>
@@ -20482,7 +20482,7 @@
         <p:spPr/>
         <p:txBody>
           <a:bodyPr>
-            <a:normAutofit/>
+            <a:normAutofit fontScale="92500" lnSpcReduction="20000"/>
           </a:bodyPr>
           <a:lstStyle/>
           <a:p>
@@ -20506,7 +20506,7 @@
           <a:p>
             <a:r>
               <a:rPr lang="es-CL" dirty="0"/>
-              <a:t>Guardar imagen en un formato vectorial</a:t>
+              <a:t>Guardar las imágenes exportadas en un formato vectorial</a:t>
             </a:r>
           </a:p>
           <a:p>
@@ -20540,9 +20540,14 @@
             </a:r>
           </a:p>
           <a:p>
-            <a:pPr marL="914400" lvl="2" indent="0">
-              <a:buNone/>
-            </a:pPr>
+            <a:r>
+              <a:rPr lang="es-CL" dirty="0"/>
+              <a:t>Permitir resetear a los valores por defecto  en la ventana de configuración </a:t>
+            </a:r>
+            <a:r>
+              <a:rPr lang="es-CL"/>
+              <a:t>del problema</a:t>
+            </a:r>
             <a:endParaRPr lang="es-MX" dirty="0"/>
           </a:p>
           <a:p>

</xml_diff>